<commit_message>
fix typo on 6b
</commit_message>
<xml_diff>
--- a/ColoradoCDO_AnalyticsChallenge_Final_Submission_Regis Waterlytics Co_FINAL.pptx
+++ b/ColoradoCDO_AnalyticsChallenge_Final_Submission_Regis Waterlytics Co_FINAL.pptx
@@ -17533,7 +17533,27 @@
                   </a:schemeClr>
                 </a:solidFill>
               </a:rPr>
-              <a:t>providers that were AWWA-policy compliant had a significantly higher percent water loss than providers that were not AWWA-policy compliant. </a:t>
+              <a:t>providers that were AWWA-policy compliant had </a:t>
+            </a:r>
+            <a:r>
+              <a:rPr lang="en-US" sz="1800" b="1">
+                <a:solidFill>
+                  <a:schemeClr val="accent5">
+                    <a:lumMod val="75000"/>
+                  </a:schemeClr>
+                </a:solidFill>
+              </a:rPr>
+              <a:t>a slightly </a:t>
+            </a:r>
+            <a:r>
+              <a:rPr lang="en-US" sz="1800" b="1" dirty="0">
+                <a:solidFill>
+                  <a:schemeClr val="accent5">
+                    <a:lumMod val="75000"/>
+                  </a:schemeClr>
+                </a:solidFill>
+              </a:rPr>
+              <a:t>higher percent water loss than providers that were not AWWA-policy compliant. </a:t>
             </a:r>
             <a:r>
               <a:rPr lang="en-US" sz="1800" dirty="0">

</xml_diff>